<commit_message>
Final examples from class
</commit_message>
<xml_diff>
--- a/Reproducible data analysis.pptx
+++ b/Reproducible data analysis.pptx
@@ -320,7 +320,7 @@
           <a:p>
             <a:fld id="{48A87A34-81AB-432B-8DAE-1953F412C126}" type="datetimeFigureOut">
               <a:rPr lang="en-US" dirty="0"/>
-              <a:t>10/9/16</a:t>
+              <a:t>10/11/16</a:t>
             </a:fld>
             <a:endParaRPr lang="en-US" dirty="0"/>
           </a:p>
@@ -582,7 +582,7 @@
           <a:p>
             <a:fld id="{48A87A34-81AB-432B-8DAE-1953F412C126}" type="datetimeFigureOut">
               <a:rPr lang="en-US" dirty="0"/>
-              <a:t>10/9/16</a:t>
+              <a:t>10/11/16</a:t>
             </a:fld>
             <a:endParaRPr lang="en-US" dirty="0"/>
           </a:p>
@@ -809,7 +809,7 @@
             <a:fld id="{48A87A34-81AB-432B-8DAE-1953F412C126}" type="datetimeFigureOut">
               <a:rPr lang="en-US" dirty="0"/>
               <a:pPr/>
-              <a:t>10/9/16</a:t>
+              <a:t>10/11/16</a:t>
             </a:fld>
             <a:endParaRPr lang="en-US" dirty="0"/>
           </a:p>
@@ -1115,7 +1115,7 @@
             <a:fld id="{48A87A34-81AB-432B-8DAE-1953F412C126}" type="datetimeFigureOut">
               <a:rPr lang="en-US" dirty="0"/>
               <a:pPr/>
-              <a:t>10/9/16</a:t>
+              <a:t>10/11/16</a:t>
             </a:fld>
             <a:endParaRPr lang="en-US" dirty="0"/>
           </a:p>
@@ -1584,7 +1584,7 @@
             <a:fld id="{48A87A34-81AB-432B-8DAE-1953F412C126}" type="datetimeFigureOut">
               <a:rPr lang="en-US" dirty="0"/>
               <a:pPr/>
-              <a:t>10/9/16</a:t>
+              <a:t>10/11/16</a:t>
             </a:fld>
             <a:endParaRPr lang="en-US" dirty="0"/>
           </a:p>
@@ -2126,7 +2126,7 @@
           <a:p>
             <a:fld id="{48A87A34-81AB-432B-8DAE-1953F412C126}" type="datetimeFigureOut">
               <a:rPr lang="en-US" dirty="0"/>
-              <a:t>10/9/16</a:t>
+              <a:t>10/11/16</a:t>
             </a:fld>
             <a:endParaRPr lang="en-US" dirty="0"/>
           </a:p>
@@ -2895,7 +2895,7 @@
           <a:p>
             <a:fld id="{48A87A34-81AB-432B-8DAE-1953F412C126}" type="datetimeFigureOut">
               <a:rPr lang="en-US" dirty="0"/>
-              <a:t>10/9/16</a:t>
+              <a:t>10/11/16</a:t>
             </a:fld>
             <a:endParaRPr lang="en-US" dirty="0"/>
           </a:p>
@@ -3065,7 +3065,7 @@
           <a:p>
             <a:fld id="{48A87A34-81AB-432B-8DAE-1953F412C126}" type="datetimeFigureOut">
               <a:rPr lang="en-US" dirty="0"/>
-              <a:t>10/9/16</a:t>
+              <a:t>10/11/16</a:t>
             </a:fld>
             <a:endParaRPr lang="en-US" dirty="0"/>
           </a:p>
@@ -3284,7 +3284,7 @@
             <a:fld id="{48A87A34-81AB-432B-8DAE-1953F412C126}" type="datetimeFigureOut">
               <a:rPr lang="en-US" dirty="0"/>
               <a:pPr/>
-              <a:t>10/9/16</a:t>
+              <a:t>10/11/16</a:t>
             </a:fld>
             <a:endParaRPr lang="en-US" dirty="0"/>
           </a:p>
@@ -3459,7 +3459,7 @@
           <a:p>
             <a:fld id="{48A87A34-81AB-432B-8DAE-1953F412C126}" type="datetimeFigureOut">
               <a:rPr lang="en-US" dirty="0"/>
-              <a:t>10/9/16</a:t>
+              <a:t>10/11/16</a:t>
             </a:fld>
             <a:endParaRPr lang="en-US" dirty="0"/>
           </a:p>
@@ -3744,7 +3744,7 @@
             <a:fld id="{48A87A34-81AB-432B-8DAE-1953F412C126}" type="datetimeFigureOut">
               <a:rPr lang="en-US" dirty="0"/>
               <a:pPr/>
-              <a:t>10/9/16</a:t>
+              <a:t>10/11/16</a:t>
             </a:fld>
             <a:endParaRPr lang="en-US" dirty="0"/>
           </a:p>
@@ -3981,7 +3981,7 @@
           <a:p>
             <a:fld id="{48A87A34-81AB-432B-8DAE-1953F412C126}" type="datetimeFigureOut">
               <a:rPr lang="en-US" dirty="0"/>
-              <a:t>10/9/16</a:t>
+              <a:t>10/11/16</a:t>
             </a:fld>
             <a:endParaRPr lang="en-US" dirty="0"/>
           </a:p>
@@ -4355,7 +4355,7 @@
           <a:p>
             <a:fld id="{48A87A34-81AB-432B-8DAE-1953F412C126}" type="datetimeFigureOut">
               <a:rPr lang="en-US" dirty="0"/>
-              <a:t>10/9/16</a:t>
+              <a:t>10/11/16</a:t>
             </a:fld>
             <a:endParaRPr lang="en-US" dirty="0"/>
           </a:p>
@@ -4468,7 +4468,7 @@
           <a:p>
             <a:fld id="{48A87A34-81AB-432B-8DAE-1953F412C126}" type="datetimeFigureOut">
               <a:rPr lang="en-US" dirty="0"/>
-              <a:t>10/9/16</a:t>
+              <a:t>10/11/16</a:t>
             </a:fld>
             <a:endParaRPr lang="en-US" dirty="0"/>
           </a:p>
@@ -4558,7 +4558,7 @@
           <a:p>
             <a:fld id="{48A87A34-81AB-432B-8DAE-1953F412C126}" type="datetimeFigureOut">
               <a:rPr lang="en-US" dirty="0"/>
-              <a:t>10/9/16</a:t>
+              <a:t>10/11/16</a:t>
             </a:fld>
             <a:endParaRPr lang="en-US" dirty="0"/>
           </a:p>
@@ -4802,7 +4802,7 @@
           <a:p>
             <a:fld id="{48A87A34-81AB-432B-8DAE-1953F412C126}" type="datetimeFigureOut">
               <a:rPr lang="en-US" dirty="0"/>
-              <a:t>10/9/16</a:t>
+              <a:t>10/11/16</a:t>
             </a:fld>
             <a:endParaRPr lang="en-US" dirty="0"/>
           </a:p>
@@ -5054,7 +5054,7 @@
           <a:p>
             <a:fld id="{48A87A34-81AB-432B-8DAE-1953F412C126}" type="datetimeFigureOut">
               <a:rPr lang="en-US" dirty="0"/>
-              <a:t>10/9/16</a:t>
+              <a:t>10/11/16</a:t>
             </a:fld>
             <a:endParaRPr lang="en-US" dirty="0"/>
           </a:p>
@@ -5293,7 +5293,7 @@
             <a:fld id="{48A87A34-81AB-432B-8DAE-1953F412C126}" type="datetimeFigureOut">
               <a:rPr lang="en-US" dirty="0"/>
               <a:pPr/>
-              <a:t>10/9/16</a:t>
+              <a:t>10/11/16</a:t>
             </a:fld>
             <a:endParaRPr lang="en-US" dirty="0"/>
           </a:p>
@@ -5754,6 +5754,13 @@
   <p:clrMapOvr>
     <a:masterClrMapping/>
   </p:clrMapOvr>
+  <p:timing>
+    <p:tnLst>
+      <p:par>
+        <p:cTn id="1" dur="indefinite" restart="never" nodeType="tmRoot"/>
+      </p:par>
+    </p:tnLst>
+  </p:timing>
 </p:sld>
 </file>
 
@@ -7044,11 +7051,6 @@
               </a:rPr>
               <a:t>), head)</a:t>
             </a:r>
-            <a:endParaRPr lang="en-US" dirty="0">
-              <a:latin typeface="Lucida Console" charset="0"/>
-              <a:ea typeface="Lucida Console" charset="0"/>
-              <a:cs typeface="Lucida Console" charset="0"/>
-            </a:endParaRPr>
           </a:p>
         </p:txBody>
       </p:sp>
@@ -7600,6 +7602,13 @@
   <p:clrMapOvr>
     <a:masterClrMapping/>
   </p:clrMapOvr>
+  <p:timing>
+    <p:tnLst>
+      <p:par>
+        <p:cTn id="1" dur="indefinite" restart="never" nodeType="tmRoot"/>
+      </p:par>
+    </p:tnLst>
+  </p:timing>
 </p:sld>
 </file>
 
@@ -9587,6 +9596,13 @@
   <p:clrMapOvr>
     <a:masterClrMapping/>
   </p:clrMapOvr>
+  <p:timing>
+    <p:tnLst>
+      <p:par>
+        <p:cTn id="1" dur="indefinite" restart="never" nodeType="tmRoot"/>
+      </p:par>
+    </p:tnLst>
+  </p:timing>
 </p:sld>
 </file>
 
@@ -10641,7 +10657,9 @@
         </p:nvSpPr>
         <p:spPr/>
         <p:txBody>
-          <a:bodyPr/>
+          <a:bodyPr>
+            <a:normAutofit fontScale="92500" lnSpcReduction="10000"/>
+          </a:bodyPr>
           <a:lstStyle/>
           <a:p>
             <a:r>
@@ -10766,25 +10784,19 @@
               <a:rPr lang="en-US" dirty="0">
                 <a:hlinkClick r:id="rId6"/>
               </a:rPr>
-              <a:t>https://www.rstudio.com</a:t>
-            </a:r>
-            <a:r>
-              <a:rPr lang="en-US">
-                <a:hlinkClick r:id="rId6"/>
-              </a:rPr>
-              <a:t>/resources/webinars/reproducible-reporting</a:t>
-            </a:r>
-            <a:r>
-              <a:rPr lang="en-US" smtClean="0">
+              <a:t>https://www.rstudio.com/resources/webinars/reproducible-reporting</a:t>
+            </a:r>
+            <a:r>
+              <a:rPr lang="en-US" dirty="0" smtClean="0">
                 <a:hlinkClick r:id="rId6"/>
               </a:rPr>
               <a:t>/</a:t>
             </a:r>
             <a:r>
-              <a:rPr lang="en-US" smtClean="0"/>
+              <a:rPr lang="en-US" dirty="0" smtClean="0"/>
               <a:t> </a:t>
             </a:r>
-            <a:endParaRPr lang="en-US"/>
+            <a:endParaRPr lang="en-US" dirty="0"/>
           </a:p>
           <a:p>
             <a:r>
@@ -10819,6 +10831,26 @@
                 <a:hlinkClick r:id="rId7"/>
               </a:rPr>
               <a:t>github.com/bmewing/TCQF2016</a:t>
+            </a:r>
+            <a:endParaRPr lang="en-US" dirty="0" smtClean="0"/>
+          </a:p>
+          <a:p>
+            <a:r>
+              <a:rPr lang="en-US" dirty="0" smtClean="0"/>
+              <a:t>Learn R</a:t>
+            </a:r>
+          </a:p>
+          <a:p>
+            <a:pPr lvl="1"/>
+            <a:r>
+              <a:rPr lang="en-US" dirty="0" smtClean="0">
+                <a:hlinkClick r:id="rId8"/>
+              </a:rPr>
+              <a:t>http://www.datacamp.com</a:t>
+            </a:r>
+            <a:r>
+              <a:rPr lang="en-US" dirty="0" smtClean="0"/>
+              <a:t> </a:t>
             </a:r>
             <a:endParaRPr lang="en-US" dirty="0"/>
           </a:p>
@@ -10945,6 +10977,13 @@
   <p:clrMapOvr>
     <a:masterClrMapping/>
   </p:clrMapOvr>
+  <p:timing>
+    <p:tnLst>
+      <p:par>
+        <p:cTn id="1" dur="indefinite" restart="never" nodeType="tmRoot"/>
+      </p:par>
+    </p:tnLst>
+  </p:timing>
 </p:sld>
 </file>
 
@@ -11016,6 +11055,13 @@
   <p:clrMapOvr>
     <a:masterClrMapping/>
   </p:clrMapOvr>
+  <p:timing>
+    <p:tnLst>
+      <p:par>
+        <p:cTn id="1" dur="indefinite" restart="never" nodeType="tmRoot"/>
+      </p:par>
+    </p:tnLst>
+  </p:timing>
 </p:sld>
 </file>
 
@@ -11159,6 +11205,13 @@
   <p:clrMapOvr>
     <a:masterClrMapping/>
   </p:clrMapOvr>
+  <p:timing>
+    <p:tnLst>
+      <p:par>
+        <p:cTn id="1" dur="indefinite" restart="never" nodeType="tmRoot"/>
+      </p:par>
+    </p:tnLst>
+  </p:timing>
 </p:sld>
 </file>
 
@@ -11318,6 +11371,13 @@
   <p:clrMapOvr>
     <a:masterClrMapping/>
   </p:clrMapOvr>
+  <p:timing>
+    <p:tnLst>
+      <p:par>
+        <p:cTn id="1" dur="indefinite" restart="never" nodeType="tmRoot"/>
+      </p:par>
+    </p:tnLst>
+  </p:timing>
 </p:sld>
 </file>
 
@@ -11432,6 +11492,13 @@
   <p:clrMapOvr>
     <a:masterClrMapping/>
   </p:clrMapOvr>
+  <p:timing>
+    <p:tnLst>
+      <p:par>
+        <p:cTn id="1" dur="indefinite" restart="never" nodeType="tmRoot"/>
+      </p:par>
+    </p:tnLst>
+  </p:timing>
 </p:sld>
 </file>
 
@@ -11484,7 +11551,12 @@
             <p:ph sz="half" idx="1"/>
           </p:nvPr>
         </p:nvSpPr>
-        <p:spPr/>
+        <p:spPr>
+          <a:xfrm>
+            <a:off x="693683" y="2194559"/>
+            <a:ext cx="5334000" cy="4024125"/>
+          </a:xfrm>
+        </p:spPr>
         <p:txBody>
           <a:bodyPr/>
           <a:lstStyle/>
@@ -11562,6 +11634,13 @@
   <p:clrMapOvr>
     <a:masterClrMapping/>
   </p:clrMapOvr>
+  <p:timing>
+    <p:tnLst>
+      <p:par>
+        <p:cTn id="1" dur="indefinite" restart="never" nodeType="tmRoot"/>
+      </p:par>
+    </p:tnLst>
+  </p:timing>
 </p:sld>
 </file>
 

</xml_diff>